<commit_message>
Final v of readme and presentation
</commit_message>
<xml_diff>
--- a/Prezentacija.pptx
+++ b/Prezentacija.pptx
@@ -335,7 +335,7 @@
             <a:fld id="{1D8BD707-D9CF-40AE-B4C6-C98DA3205C09}" type="datetimeFigureOut">
               <a:rPr lang="en-US" smtClean="0"/>
               <a:pPr/>
-              <a:t>01/24/2026</a:t>
+              <a:t>01/25/2026</a:t>
             </a:fld>
             <a:endParaRPr lang="en-US"/>
           </a:p>
@@ -503,7 +503,7 @@
             <a:fld id="{1D8BD707-D9CF-40AE-B4C6-C98DA3205C09}" type="datetimeFigureOut">
               <a:rPr lang="en-US" smtClean="0"/>
               <a:pPr/>
-              <a:t>01/24/2026</a:t>
+              <a:t>01/25/2026</a:t>
             </a:fld>
             <a:endParaRPr lang="en-US"/>
           </a:p>
@@ -681,7 +681,7 @@
             <a:fld id="{1D8BD707-D9CF-40AE-B4C6-C98DA3205C09}" type="datetimeFigureOut">
               <a:rPr lang="en-US" smtClean="0"/>
               <a:pPr/>
-              <a:t>01/24/2026</a:t>
+              <a:t>01/25/2026</a:t>
             </a:fld>
             <a:endParaRPr lang="en-US"/>
           </a:p>
@@ -849,7 +849,7 @@
             <a:fld id="{1D8BD707-D9CF-40AE-B4C6-C98DA3205C09}" type="datetimeFigureOut">
               <a:rPr lang="en-US" smtClean="0"/>
               <a:pPr/>
-              <a:t>01/24/2026</a:t>
+              <a:t>01/25/2026</a:t>
             </a:fld>
             <a:endParaRPr lang="en-US"/>
           </a:p>
@@ -1094,7 +1094,7 @@
             <a:fld id="{1D8BD707-D9CF-40AE-B4C6-C98DA3205C09}" type="datetimeFigureOut">
               <a:rPr lang="en-US" smtClean="0"/>
               <a:pPr/>
-              <a:t>01/24/2026</a:t>
+              <a:t>01/25/2026</a:t>
             </a:fld>
             <a:endParaRPr lang="en-US"/>
           </a:p>
@@ -1379,7 +1379,7 @@
             <a:fld id="{1D8BD707-D9CF-40AE-B4C6-C98DA3205C09}" type="datetimeFigureOut">
               <a:rPr lang="en-US" smtClean="0"/>
               <a:pPr/>
-              <a:t>01/24/2026</a:t>
+              <a:t>01/25/2026</a:t>
             </a:fld>
             <a:endParaRPr lang="en-US"/>
           </a:p>
@@ -1798,7 +1798,7 @@
             <a:fld id="{1D8BD707-D9CF-40AE-B4C6-C98DA3205C09}" type="datetimeFigureOut">
               <a:rPr lang="en-US" smtClean="0"/>
               <a:pPr/>
-              <a:t>01/24/2026</a:t>
+              <a:t>01/25/2026</a:t>
             </a:fld>
             <a:endParaRPr lang="en-US"/>
           </a:p>
@@ -1915,7 +1915,7 @@
             <a:fld id="{1D8BD707-D9CF-40AE-B4C6-C98DA3205C09}" type="datetimeFigureOut">
               <a:rPr lang="en-US" smtClean="0"/>
               <a:pPr/>
-              <a:t>01/24/2026</a:t>
+              <a:t>01/25/2026</a:t>
             </a:fld>
             <a:endParaRPr lang="en-US"/>
           </a:p>
@@ -2010,7 +2010,7 @@
             <a:fld id="{1D8BD707-D9CF-40AE-B4C6-C98DA3205C09}" type="datetimeFigureOut">
               <a:rPr lang="en-US" smtClean="0"/>
               <a:pPr/>
-              <a:t>01/24/2026</a:t>
+              <a:t>01/25/2026</a:t>
             </a:fld>
             <a:endParaRPr lang="en-US"/>
           </a:p>
@@ -2285,7 +2285,7 @@
             <a:fld id="{1D8BD707-D9CF-40AE-B4C6-C98DA3205C09}" type="datetimeFigureOut">
               <a:rPr lang="en-US" smtClean="0"/>
               <a:pPr/>
-              <a:t>01/24/2026</a:t>
+              <a:t>01/25/2026</a:t>
             </a:fld>
             <a:endParaRPr lang="en-US"/>
           </a:p>
@@ -2537,7 +2537,7 @@
             <a:fld id="{1D8BD707-D9CF-40AE-B4C6-C98DA3205C09}" type="datetimeFigureOut">
               <a:rPr lang="en-US" smtClean="0"/>
               <a:pPr/>
-              <a:t>01/24/2026</a:t>
+              <a:t>01/25/2026</a:t>
             </a:fld>
             <a:endParaRPr lang="en-US"/>
           </a:p>
@@ -2748,7 +2748,7 @@
             <a:fld id="{1D8BD707-D9CF-40AE-B4C6-C98DA3205C09}" type="datetimeFigureOut">
               <a:rPr lang="en-US" smtClean="0"/>
               <a:pPr/>
-              <a:t>01/24/2026</a:t>
+              <a:t>01/25/2026</a:t>
             </a:fld>
             <a:endParaRPr lang="en-US"/>
           </a:p>
@@ -3906,7 +3906,7 @@
               </a:spcBef>
             </a:pPr>
             <a:r>
-              <a:rPr lang="sr-Latn-RS" sz="1800" b="1" dirty="0">
+              <a:rPr lang="sr-Latn-RS" b="1" dirty="0">
                 <a:solidFill>
                   <a:srgbClr val="000000"/>
                 </a:solidFill>
@@ -3915,20 +3915,17 @@
                 <a:cs typeface="Inter"/>
                 <a:sym typeface="Inter"/>
               </a:rPr>
-              <a:t>Đorđević Aleksandar </a:t>
-            </a:r>
-            <a:r>
-              <a:rPr lang="sr-Latn-RS" b="1" dirty="0">
-                <a:solidFill>
-                  <a:srgbClr val="000000"/>
-                </a:solidFill>
-                <a:latin typeface="Inter"/>
-                <a:ea typeface="Inter"/>
-                <a:cs typeface="Inter"/>
-                <a:sym typeface="Inter"/>
-              </a:rPr>
-              <a:t>2147</a:t>
-            </a:r>
+              <a:t>Napredno softversko inženjerstvo</a:t>
+            </a:r>
+            <a:endParaRPr lang="en-US" b="1" dirty="0">
+              <a:solidFill>
+                <a:srgbClr val="000000"/>
+              </a:solidFill>
+              <a:latin typeface="Inter"/>
+              <a:ea typeface="Inter"/>
+              <a:cs typeface="Inter"/>
+              <a:sym typeface="Inter"/>
+            </a:endParaRPr>
           </a:p>
           <a:p>
             <a:pPr algn="r">
@@ -3949,7 +3946,19 @@
                 <a:cs typeface="Inter"/>
                 <a:sym typeface="Inter"/>
               </a:rPr>
-              <a:t>Napredno softversko inženjerstvo</a:t>
+              <a:t>Đorđević Aleksandar </a:t>
+            </a:r>
+            <a:r>
+              <a:rPr lang="sr-Latn-RS" b="1" dirty="0">
+                <a:solidFill>
+                  <a:srgbClr val="000000"/>
+                </a:solidFill>
+                <a:latin typeface="Inter"/>
+                <a:ea typeface="Inter"/>
+                <a:cs typeface="Inter"/>
+                <a:sym typeface="Inter"/>
+              </a:rPr>
+              <a:t>2147</a:t>
             </a:r>
             <a:endParaRPr lang="en-US" sz="1800" b="1" dirty="0">
               <a:solidFill>
@@ -4625,7 +4634,7 @@
                 <a:cs typeface="Inter Medium"/>
                 <a:sym typeface="Inter Medium"/>
               </a:rPr>
-              <a:t>PAGE 10</a:t>
+              <a:t>10</a:t>
             </a:r>
           </a:p>
         </p:txBody>
@@ -5167,7 +5176,7 @@
                 <a:cs typeface="Inter Medium"/>
                 <a:sym typeface="Inter Medium"/>
               </a:rPr>
-              <a:t>PAGE 11</a:t>
+              <a:t>11</a:t>
             </a:r>
           </a:p>
         </p:txBody>
@@ -6361,7 +6370,7 @@
                 <a:cs typeface="Inter Medium"/>
                 <a:sym typeface="Inter Medium"/>
               </a:rPr>
-              <a:t>PAGE 12</a:t>
+              <a:t>12</a:t>
             </a:r>
           </a:p>
         </p:txBody>
@@ -7455,7 +7464,7 @@
                 <a:cs typeface="Inter Medium"/>
                 <a:sym typeface="Inter Medium"/>
               </a:rPr>
-              <a:t>PAGE 13</a:t>
+              <a:t>13</a:t>
             </a:r>
           </a:p>
         </p:txBody>
@@ -8092,7 +8101,7 @@
                 <a:cs typeface="Inter Medium"/>
                 <a:sym typeface="Inter Medium"/>
               </a:rPr>
-              <a:t>PAGE 14</a:t>
+              <a:t>14</a:t>
             </a:r>
           </a:p>
         </p:txBody>
@@ -9105,7 +9114,7 @@
                 <a:cs typeface="Inter Medium"/>
                 <a:sym typeface="Inter Medium"/>
               </a:rPr>
-              <a:t>PAGE 15</a:t>
+              <a:t>15</a:t>
             </a:r>
           </a:p>
         </p:txBody>
@@ -9495,7 +9504,7 @@
                 <a:cs typeface="Inter Medium"/>
                 <a:sym typeface="Inter Medium"/>
               </a:rPr>
-              <a:t>PAGE 16</a:t>
+              <a:t>16</a:t>
             </a:r>
           </a:p>
         </p:txBody>
@@ -12253,7 +12262,7 @@
                 <a:cs typeface="Inter Medium"/>
                 <a:sym typeface="Inter Medium"/>
               </a:rPr>
-              <a:t>PAGE 17</a:t>
+              <a:t>17</a:t>
             </a:r>
           </a:p>
         </p:txBody>
@@ -12461,7 +12470,7 @@
         </p:nvSpPr>
         <p:spPr>
           <a:xfrm>
-            <a:off x="1051240" y="3412996"/>
+            <a:off x="1705340" y="3412996"/>
             <a:ext cx="6676660" cy="948849"/>
           </a:xfrm>
           <a:prstGeom prst="rect">
@@ -12557,7 +12566,7 @@
                 <a:cs typeface="Inter Medium"/>
                 <a:sym typeface="Inter Medium"/>
               </a:rPr>
-              <a:t>PAGE 18</a:t>
+              <a:t>18</a:t>
             </a:r>
           </a:p>
         </p:txBody>
@@ -14190,7 +14199,7 @@
         </p:blipFill>
         <p:spPr>
           <a:xfrm>
-            <a:off x="1712460" y="5168825"/>
+            <a:off x="2366560" y="5168825"/>
             <a:ext cx="1512662" cy="1512662"/>
           </a:xfrm>
           <a:prstGeom prst="rect">
@@ -14416,7 +14425,7 @@
                 <a:cs typeface="Inter Medium"/>
                 <a:sym typeface="Inter Medium"/>
               </a:rPr>
-              <a:t>PAGE 19</a:t>
+              <a:t>19</a:t>
             </a:r>
           </a:p>
         </p:txBody>
@@ -14752,6 +14761,60 @@
           <a:chExt cx="0" cy="0"/>
         </a:xfrm>
       </p:grpSpPr>
+      <p:sp>
+        <p:nvSpPr>
+          <p:cNvPr id="19" name="Rectangle: Rounded Corners 18">
+            <a:extLst>
+              <a:ext uri="{FF2B5EF4-FFF2-40B4-BE49-F238E27FC236}">
+                <a16:creationId xmlns:a16="http://schemas.microsoft.com/office/drawing/2014/main" id="{12EC33FA-C08F-4635-9E4C-C35E77419C25}"/>
+              </a:ext>
+            </a:extLst>
+          </p:cNvPr>
+          <p:cNvSpPr/>
+          <p:nvPr/>
+        </p:nvSpPr>
+        <p:spPr>
+          <a:xfrm>
+            <a:off x="874724" y="3217624"/>
+            <a:ext cx="5981868" cy="2286000"/>
+          </a:xfrm>
+          <a:prstGeom prst="roundRect">
+            <a:avLst/>
+          </a:prstGeom>
+          <a:noFill/>
+          <a:ln w="19050" cap="flat" cmpd="sng" algn="ctr">
+            <a:solidFill>
+              <a:schemeClr val="dk1"/>
+            </a:solidFill>
+            <a:prstDash val="solid"/>
+            <a:round/>
+            <a:headEnd type="none" w="med" len="med"/>
+            <a:tailEnd type="none" w="med" len="med"/>
+          </a:ln>
+        </p:spPr>
+        <p:style>
+          <a:lnRef idx="0">
+            <a:scrgbClr r="0" g="0" b="0"/>
+          </a:lnRef>
+          <a:fillRef idx="0">
+            <a:scrgbClr r="0" g="0" b="0"/>
+          </a:fillRef>
+          <a:effectRef idx="0">
+            <a:scrgbClr r="0" g="0" b="0"/>
+          </a:effectRef>
+          <a:fontRef idx="minor">
+            <a:schemeClr val="dk1"/>
+          </a:fontRef>
+        </p:style>
+        <p:txBody>
+          <a:bodyPr rtlCol="0" anchor="ctr"/>
+          <a:lstStyle/>
+          <a:p>
+            <a:pPr algn="ctr"/>
+            <a:endParaRPr lang="en-US" dirty="0"/>
+          </a:p>
+        </p:txBody>
+      </p:sp>
       <p:grpSp>
         <p:nvGrpSpPr>
           <p:cNvPr id="2" name="Group 2"/>
@@ -15321,7 +15384,7 @@
         <p:spPr>
           <a:xfrm>
             <a:off x="15866051" y="981075"/>
-            <a:ext cx="1393249" cy="365760"/>
+            <a:ext cx="1393249" cy="343364"/>
           </a:xfrm>
           <a:prstGeom prst="rect">
             <a:avLst/>
@@ -15342,7 +15405,7 @@
               </a:spcBef>
             </a:pPr>
             <a:r>
-              <a:rPr lang="en-US" sz="2100" b="1">
+              <a:rPr lang="en-US" sz="2100" b="1" dirty="0">
                 <a:solidFill>
                   <a:srgbClr val="000000"/>
                 </a:solidFill>
@@ -15351,7 +15414,7 @@
                 <a:cs typeface="Inter Medium"/>
                 <a:sym typeface="Inter Medium"/>
               </a:rPr>
-              <a:t>PAGE 02</a:t>
+              <a:t>02</a:t>
             </a:r>
           </a:p>
         </p:txBody>
@@ -15655,60 +15718,6 @@
               <a:cs typeface="Inter"/>
               <a:sym typeface="Inter"/>
             </a:endParaRPr>
-          </a:p>
-        </p:txBody>
-      </p:sp>
-      <p:sp>
-        <p:nvSpPr>
-          <p:cNvPr id="19" name="Rectangle: Rounded Corners 18">
-            <a:extLst>
-              <a:ext uri="{FF2B5EF4-FFF2-40B4-BE49-F238E27FC236}">
-                <a16:creationId xmlns:a16="http://schemas.microsoft.com/office/drawing/2014/main" id="{12EC33FA-C08F-4635-9E4C-C35E77419C25}"/>
-              </a:ext>
-            </a:extLst>
-          </p:cNvPr>
-          <p:cNvSpPr/>
-          <p:nvPr/>
-        </p:nvSpPr>
-        <p:spPr>
-          <a:xfrm>
-            <a:off x="874724" y="3217624"/>
-            <a:ext cx="5981868" cy="2286000"/>
-          </a:xfrm>
-          <a:prstGeom prst="roundRect">
-            <a:avLst/>
-          </a:prstGeom>
-          <a:noFill/>
-          <a:ln w="19050" cap="flat" cmpd="sng" algn="ctr">
-            <a:solidFill>
-              <a:schemeClr val="dk1"/>
-            </a:solidFill>
-            <a:prstDash val="solid"/>
-            <a:round/>
-            <a:headEnd type="none" w="med" len="med"/>
-            <a:tailEnd type="none" w="med" len="med"/>
-          </a:ln>
-        </p:spPr>
-        <p:style>
-          <a:lnRef idx="0">
-            <a:scrgbClr r="0" g="0" b="0"/>
-          </a:lnRef>
-          <a:fillRef idx="0">
-            <a:scrgbClr r="0" g="0" b="0"/>
-          </a:fillRef>
-          <a:effectRef idx="0">
-            <a:scrgbClr r="0" g="0" b="0"/>
-          </a:effectRef>
-          <a:fontRef idx="minor">
-            <a:schemeClr val="dk1"/>
-          </a:fontRef>
-        </p:style>
-        <p:txBody>
-          <a:bodyPr rtlCol="0" anchor="ctr"/>
-          <a:lstStyle/>
-          <a:p>
-            <a:pPr algn="ctr"/>
-            <a:endParaRPr lang="en-US"/>
           </a:p>
         </p:txBody>
       </p:sp>
@@ -16071,7 +16080,7 @@
         <p:spPr>
           <a:xfrm>
             <a:off x="15866051" y="981075"/>
-            <a:ext cx="1393249" cy="365760"/>
+            <a:ext cx="1393249" cy="343364"/>
           </a:xfrm>
           <a:prstGeom prst="rect">
             <a:avLst/>
@@ -16092,7 +16101,7 @@
               </a:spcBef>
             </a:pPr>
             <a:r>
-              <a:rPr lang="en-US" sz="2100" b="1">
+              <a:rPr lang="en-US" sz="2100" b="1" dirty="0">
                 <a:solidFill>
                   <a:srgbClr val="000000"/>
                 </a:solidFill>
@@ -16101,7 +16110,7 @@
                 <a:cs typeface="Inter Medium"/>
                 <a:sym typeface="Inter Medium"/>
               </a:rPr>
-              <a:t>PAGE 03</a:t>
+              <a:t>03</a:t>
             </a:r>
           </a:p>
         </p:txBody>
@@ -17099,7 +17108,7 @@
                 <a:cs typeface="Inter Medium"/>
                 <a:sym typeface="Inter Medium"/>
               </a:rPr>
-              <a:t>PAGE 04</a:t>
+              <a:t>04</a:t>
             </a:r>
           </a:p>
         </p:txBody>
@@ -18112,7 +18121,7 @@
                 <a:cs typeface="Inter Medium"/>
                 <a:sym typeface="Inter Medium"/>
               </a:rPr>
-              <a:t>PAGE 05</a:t>
+              <a:t>05</a:t>
             </a:r>
           </a:p>
         </p:txBody>
@@ -19783,7 +19792,7 @@
                 <a:cs typeface="Inter Medium"/>
                 <a:sym typeface="Inter Medium"/>
               </a:rPr>
-              <a:t>PAGE 06</a:t>
+              <a:t>06</a:t>
             </a:r>
           </a:p>
         </p:txBody>
@@ -20737,7 +20746,7 @@
                 <a:cs typeface="Inter Medium"/>
                 <a:sym typeface="Inter Medium"/>
               </a:rPr>
-              <a:t>PAGE 07</a:t>
+              <a:t>07</a:t>
             </a:r>
           </a:p>
         </p:txBody>
@@ -21421,7 +21430,7 @@
                 <a:cs typeface="Inter Medium"/>
                 <a:sym typeface="Inter Medium"/>
               </a:rPr>
-              <a:t>PAGE 08</a:t>
+              <a:t>08</a:t>
             </a:r>
           </a:p>
         </p:txBody>
@@ -23799,7 +23808,7 @@
                 <a:cs typeface="Inter Medium"/>
                 <a:sym typeface="Inter Medium"/>
               </a:rPr>
-              <a:t>PAGE 09</a:t>
+              <a:t>09</a:t>
             </a:r>
           </a:p>
         </p:txBody>

</xml_diff>